<commit_message>
Minor fixes on 10.2-GUI-Apps-Streams-and-Files
</commit_message>
<xml_diff>
--- a/Courses/Software-Sciences/Module-2-DS-and-Algo/10.2-GUI-Apps-Streams-&-Files/10.2-GUI-Apps-Streams-and-Files.pptx
+++ b/Courses/Software-Sciences/Module-2-DS-and-Algo/10.2-GUI-Apps-Streams-&-Files/10.2-GUI-Apps-Streams-and-Files.pptx
@@ -313,7 +313,7 @@
           <a:p>
             <a:fld id="{4E087215-0C8F-4762-A664-737A353EC9A4}" type="datetimeFigureOut">
               <a:rPr lang="bg-BG" smtClean="0"/>
-              <a:t>17.9.2023 г.</a:t>
+              <a:t>18.9.2023 г.</a:t>
             </a:fld>
             <a:endParaRPr lang="bg-BG"/>
           </a:p>
@@ -509,7 +509,7 @@
           <a:p>
             <a:fld id="{72D84649-876A-46C9-8472-14CB09C070D8}" type="datetimeFigureOut">
               <a:rPr lang="en-US" smtClean="0"/>
-              <a:t>9/17/2023</a:t>
+              <a:t>9/18/2023</a:t>
             </a:fld>
             <a:endParaRPr lang="en-US"/>
           </a:p>
@@ -9794,87 +9794,6 @@
           </a:p>
         </p:txBody>
       </p:sp>
-      <p:pic>
-        <p:nvPicPr>
-          <p:cNvPr id="7" name="Картина 6">
-            <a:extLst>
-              <a:ext uri="{FF2B5EF4-FFF2-40B4-BE49-F238E27FC236}">
-                <a16:creationId xmlns:a16="http://schemas.microsoft.com/office/drawing/2014/main" id="{5A4C8008-1C42-D15B-69A7-FC25984F20F9}"/>
-              </a:ext>
-            </a:extLst>
-          </p:cNvPr>
-          <p:cNvPicPr>
-            <a:picLocks noChangeAspect="1"/>
-          </p:cNvPicPr>
-          <p:nvPr/>
-        </p:nvPicPr>
-        <p:blipFill>
-          <a:blip r:embed="rId2"/>
-          <a:stretch>
-            <a:fillRect/>
-          </a:stretch>
-        </p:blipFill>
-        <p:spPr>
-          <a:xfrm>
-            <a:off x="2136000" y="1113441"/>
-            <a:ext cx="7633564" cy="5723216"/>
-          </a:xfrm>
-          <a:prstGeom prst="rect">
-            <a:avLst/>
-          </a:prstGeom>
-          <a:ln>
-            <a:solidFill>
-              <a:schemeClr val="bg2">
-                <a:lumMod val="75000"/>
-              </a:schemeClr>
-            </a:solidFill>
-          </a:ln>
-        </p:spPr>
-      </p:pic>
-      <p:cxnSp>
-        <p:nvCxnSpPr>
-          <p:cNvPr id="8" name="Straight Arrow Connector 7">
-            <a:extLst>
-              <a:ext uri="{FF2B5EF4-FFF2-40B4-BE49-F238E27FC236}">
-                <a16:creationId xmlns:a16="http://schemas.microsoft.com/office/drawing/2014/main" id="{70C925E0-300B-D5BF-341E-DC596AE0F8B3}"/>
-              </a:ext>
-            </a:extLst>
-          </p:cNvPr>
-          <p:cNvCxnSpPr>
-            <a:cxnSpLocks/>
-          </p:cNvCxnSpPr>
-          <p:nvPr/>
-        </p:nvCxnSpPr>
-        <p:spPr>
-          <a:xfrm flipH="1">
-            <a:off x="9246000" y="3671873"/>
-            <a:ext cx="720000" cy="765000"/>
-          </a:xfrm>
-          <a:prstGeom prst="straightConnector1">
-            <a:avLst/>
-          </a:prstGeom>
-          <a:ln w="57150">
-            <a:solidFill>
-              <a:schemeClr val="tx2"/>
-            </a:solidFill>
-            <a:tailEnd type="triangle"/>
-          </a:ln>
-        </p:spPr>
-        <p:style>
-          <a:lnRef idx="1">
-            <a:schemeClr val="accent1"/>
-          </a:lnRef>
-          <a:fillRef idx="0">
-            <a:schemeClr val="accent1"/>
-          </a:fillRef>
-          <a:effectRef idx="0">
-            <a:schemeClr val="accent1"/>
-          </a:effectRef>
-          <a:fontRef idx="minor">
-            <a:schemeClr val="tx1"/>
-          </a:fontRef>
-        </p:style>
-      </p:cxnSp>
       <p:sp>
         <p:nvSpPr>
           <p:cNvPr id="3" name="Slide Number">
@@ -9917,6 +9836,86 @@
           </a:p>
         </p:txBody>
       </p:sp>
+      <p:pic>
+        <p:nvPicPr>
+          <p:cNvPr id="9" name="Картина 8">
+            <a:extLst>
+              <a:ext uri="{FF2B5EF4-FFF2-40B4-BE49-F238E27FC236}">
+                <a16:creationId xmlns:a16="http://schemas.microsoft.com/office/drawing/2014/main" id="{4DB390CA-F1C5-A6B9-9521-0E86236D1961}"/>
+              </a:ext>
+            </a:extLst>
+          </p:cNvPr>
+          <p:cNvPicPr>
+            <a:picLocks noChangeAspect="1"/>
+          </p:cNvPicPr>
+          <p:nvPr/>
+        </p:nvPicPr>
+        <p:blipFill>
+          <a:blip r:embed="rId2">
+            <a:extLst>
+              <a:ext uri="{28A0092B-C50C-407E-A947-70E740481C1C}">
+                <a14:useLocalDpi xmlns:a14="http://schemas.microsoft.com/office/drawing/2010/main" val="0"/>
+              </a:ext>
+            </a:extLst>
+          </a:blip>
+          <a:stretch>
+            <a:fillRect/>
+          </a:stretch>
+        </p:blipFill>
+        <p:spPr>
+          <a:xfrm>
+            <a:off x="2135999" y="1084082"/>
+            <a:ext cx="8272305" cy="5769002"/>
+          </a:xfrm>
+          <a:prstGeom prst="rect">
+            <a:avLst/>
+          </a:prstGeom>
+        </p:spPr>
+      </p:pic>
+      <p:cxnSp>
+        <p:nvCxnSpPr>
+          <p:cNvPr id="8" name="Straight Arrow Connector 7">
+            <a:extLst>
+              <a:ext uri="{FF2B5EF4-FFF2-40B4-BE49-F238E27FC236}">
+                <a16:creationId xmlns:a16="http://schemas.microsoft.com/office/drawing/2014/main" id="{70C925E0-300B-D5BF-341E-DC596AE0F8B3}"/>
+              </a:ext>
+            </a:extLst>
+          </p:cNvPr>
+          <p:cNvCxnSpPr>
+            <a:cxnSpLocks/>
+          </p:cNvCxnSpPr>
+          <p:nvPr/>
+        </p:nvCxnSpPr>
+        <p:spPr>
+          <a:xfrm flipH="1">
+            <a:off x="9741000" y="4599000"/>
+            <a:ext cx="720000" cy="765000"/>
+          </a:xfrm>
+          <a:prstGeom prst="straightConnector1">
+            <a:avLst/>
+          </a:prstGeom>
+          <a:ln w="57150">
+            <a:solidFill>
+              <a:schemeClr val="tx2"/>
+            </a:solidFill>
+            <a:tailEnd type="triangle"/>
+          </a:ln>
+        </p:spPr>
+        <p:style>
+          <a:lnRef idx="1">
+            <a:schemeClr val="accent1"/>
+          </a:lnRef>
+          <a:fillRef idx="0">
+            <a:schemeClr val="accent1"/>
+          </a:fillRef>
+          <a:effectRef idx="0">
+            <a:schemeClr val="accent1"/>
+          </a:effectRef>
+          <a:fontRef idx="minor">
+            <a:schemeClr val="tx1"/>
+          </a:fontRef>
+        </p:style>
+      </p:cxnSp>
     </p:spTree>
     <p:extLst>
       <p:ext uri="{BB962C8B-B14F-4D97-AF65-F5344CB8AC3E}">
@@ -12679,80 +12678,6 @@
           </a:p>
         </p:txBody>
       </p:sp>
-      <p:pic>
-        <p:nvPicPr>
-          <p:cNvPr id="9" name="Картина 8">
-            <a:extLst>
-              <a:ext uri="{FF2B5EF4-FFF2-40B4-BE49-F238E27FC236}">
-                <a16:creationId xmlns:a16="http://schemas.microsoft.com/office/drawing/2014/main" id="{5711967A-65B0-4CD8-A32F-E5D3DCE6979E}"/>
-              </a:ext>
-            </a:extLst>
-          </p:cNvPr>
-          <p:cNvPicPr>
-            <a:picLocks noChangeAspect="1"/>
-          </p:cNvPicPr>
-          <p:nvPr/>
-        </p:nvPicPr>
-        <p:blipFill>
-          <a:blip r:embed="rId2"/>
-          <a:stretch>
-            <a:fillRect/>
-          </a:stretch>
-        </p:blipFill>
-        <p:spPr>
-          <a:xfrm>
-            <a:off x="2248500" y="1124009"/>
-            <a:ext cx="7695000" cy="5733991"/>
-          </a:xfrm>
-          <a:prstGeom prst="rect">
-            <a:avLst/>
-          </a:prstGeom>
-        </p:spPr>
-      </p:pic>
-      <p:cxnSp>
-        <p:nvCxnSpPr>
-          <p:cNvPr id="10" name="Straight Arrow Connector 7">
-            <a:extLst>
-              <a:ext uri="{FF2B5EF4-FFF2-40B4-BE49-F238E27FC236}">
-                <a16:creationId xmlns:a16="http://schemas.microsoft.com/office/drawing/2014/main" id="{FB3C2B37-4CE2-2A05-19DB-424AECACDB96}"/>
-              </a:ext>
-            </a:extLst>
-          </p:cNvPr>
-          <p:cNvCxnSpPr>
-            <a:cxnSpLocks/>
-          </p:cNvCxnSpPr>
-          <p:nvPr/>
-        </p:nvCxnSpPr>
-        <p:spPr>
-          <a:xfrm flipH="1">
-            <a:off x="9471000" y="3834000"/>
-            <a:ext cx="720000" cy="765000"/>
-          </a:xfrm>
-          <a:prstGeom prst="straightConnector1">
-            <a:avLst/>
-          </a:prstGeom>
-          <a:ln w="57150">
-            <a:solidFill>
-              <a:schemeClr val="tx2"/>
-            </a:solidFill>
-            <a:tailEnd type="triangle"/>
-          </a:ln>
-        </p:spPr>
-        <p:style>
-          <a:lnRef idx="1">
-            <a:schemeClr val="accent1"/>
-          </a:lnRef>
-          <a:fillRef idx="0">
-            <a:schemeClr val="accent1"/>
-          </a:fillRef>
-          <a:effectRef idx="0">
-            <a:schemeClr val="accent1"/>
-          </a:effectRef>
-          <a:fontRef idx="minor">
-            <a:schemeClr val="tx1"/>
-          </a:fontRef>
-        </p:style>
-      </p:cxnSp>
       <p:sp>
         <p:nvSpPr>
           <p:cNvPr id="3" name="Slide Number">
@@ -12795,6 +12720,87 @@
           </a:p>
         </p:txBody>
       </p:sp>
+      <p:pic>
+        <p:nvPicPr>
+          <p:cNvPr id="7" name="Картина 6">
+            <a:extLst>
+              <a:ext uri="{FF2B5EF4-FFF2-40B4-BE49-F238E27FC236}">
+                <a16:creationId xmlns:a16="http://schemas.microsoft.com/office/drawing/2014/main" id="{3B22F971-EF22-D2A1-027A-3FE489731970}"/>
+              </a:ext>
+            </a:extLst>
+          </p:cNvPr>
+          <p:cNvPicPr>
+            <a:picLocks noChangeAspect="1"/>
+          </p:cNvPicPr>
+          <p:nvPr/>
+        </p:nvPicPr>
+        <p:blipFill>
+          <a:blip r:embed="rId2"/>
+          <a:stretch>
+            <a:fillRect/>
+          </a:stretch>
+        </p:blipFill>
+        <p:spPr>
+          <a:xfrm>
+            <a:off x="1962131" y="1103926"/>
+            <a:ext cx="8267738" cy="5783571"/>
+          </a:xfrm>
+          <a:prstGeom prst="rect">
+            <a:avLst/>
+          </a:prstGeom>
+          <a:ln>
+            <a:solidFill>
+              <a:schemeClr val="bg2">
+                <a:lumMod val="75000"/>
+              </a:schemeClr>
+            </a:solidFill>
+          </a:ln>
+        </p:spPr>
+      </p:pic>
+      <p:cxnSp>
+        <p:nvCxnSpPr>
+          <p:cNvPr id="10" name="Straight Arrow Connector 7">
+            <a:extLst>
+              <a:ext uri="{FF2B5EF4-FFF2-40B4-BE49-F238E27FC236}">
+                <a16:creationId xmlns:a16="http://schemas.microsoft.com/office/drawing/2014/main" id="{FB3C2B37-4CE2-2A05-19DB-424AECACDB96}"/>
+              </a:ext>
+            </a:extLst>
+          </p:cNvPr>
+          <p:cNvCxnSpPr>
+            <a:cxnSpLocks/>
+          </p:cNvCxnSpPr>
+          <p:nvPr/>
+        </p:nvCxnSpPr>
+        <p:spPr>
+          <a:xfrm flipH="1">
+            <a:off x="9510082" y="4644000"/>
+            <a:ext cx="720000" cy="765000"/>
+          </a:xfrm>
+          <a:prstGeom prst="straightConnector1">
+            <a:avLst/>
+          </a:prstGeom>
+          <a:ln w="57150">
+            <a:solidFill>
+              <a:schemeClr val="tx2"/>
+            </a:solidFill>
+            <a:tailEnd type="triangle"/>
+          </a:ln>
+        </p:spPr>
+        <p:style>
+          <a:lnRef idx="1">
+            <a:schemeClr val="accent1"/>
+          </a:lnRef>
+          <a:fillRef idx="0">
+            <a:schemeClr val="accent1"/>
+          </a:fillRef>
+          <a:effectRef idx="0">
+            <a:schemeClr val="accent1"/>
+          </a:effectRef>
+          <a:fontRef idx="minor">
+            <a:schemeClr val="tx1"/>
+          </a:fontRef>
+        </p:style>
+      </p:cxnSp>
     </p:spTree>
     <p:extLst>
       <p:ext uri="{BB962C8B-B14F-4D97-AF65-F5344CB8AC3E}">
@@ -15974,7 +15980,7 @@
         </p:blipFill>
         <p:spPr>
           <a:xfrm>
-            <a:off x="2721000" y="3085508"/>
+            <a:off x="2721000" y="3115004"/>
             <a:ext cx="6255000" cy="3766692"/>
           </a:xfrm>
           <a:prstGeom prst="rect">
@@ -15982,7 +15988,7 @@
           </a:prstGeom>
           <a:ln>
             <a:solidFill>
-              <a:schemeClr val="bg1">
+              <a:schemeClr val="bg2">
                 <a:lumMod val="75000"/>
               </a:schemeClr>
             </a:solidFill>
@@ -16218,7 +16224,7 @@
           </a:prstGeom>
           <a:ln>
             <a:solidFill>
-              <a:schemeClr val="bg1">
+              <a:schemeClr val="bg2">
                 <a:lumMod val="75000"/>
               </a:schemeClr>
             </a:solidFill>
@@ -16296,80 +16302,6 @@
           </a:p>
         </p:txBody>
       </p:sp>
-      <p:pic>
-        <p:nvPicPr>
-          <p:cNvPr id="12" name="Картина 11">
-            <a:extLst>
-              <a:ext uri="{FF2B5EF4-FFF2-40B4-BE49-F238E27FC236}">
-                <a16:creationId xmlns:a16="http://schemas.microsoft.com/office/drawing/2014/main" id="{DE52F84B-E5DF-DF03-6B3C-AF1BA74FE6B6}"/>
-              </a:ext>
-            </a:extLst>
-          </p:cNvPr>
-          <p:cNvPicPr>
-            <a:picLocks noChangeAspect="1"/>
-          </p:cNvPicPr>
-          <p:nvPr/>
-        </p:nvPicPr>
-        <p:blipFill>
-          <a:blip r:embed="rId2"/>
-          <a:stretch>
-            <a:fillRect/>
-          </a:stretch>
-        </p:blipFill>
-        <p:spPr>
-          <a:xfrm>
-            <a:off x="2226000" y="1314000"/>
-            <a:ext cx="7270339" cy="5404630"/>
-          </a:xfrm>
-          <a:prstGeom prst="rect">
-            <a:avLst/>
-          </a:prstGeom>
-        </p:spPr>
-      </p:pic>
-      <p:cxnSp>
-        <p:nvCxnSpPr>
-          <p:cNvPr id="13" name="Straight Arrow Connector 7">
-            <a:extLst>
-              <a:ext uri="{FF2B5EF4-FFF2-40B4-BE49-F238E27FC236}">
-                <a16:creationId xmlns:a16="http://schemas.microsoft.com/office/drawing/2014/main" id="{8A952AA5-D23E-3465-6FBB-AF06339AB37E}"/>
-              </a:ext>
-            </a:extLst>
-          </p:cNvPr>
-          <p:cNvCxnSpPr>
-            <a:cxnSpLocks/>
-          </p:cNvCxnSpPr>
-          <p:nvPr/>
-        </p:nvCxnSpPr>
-        <p:spPr>
-          <a:xfrm flipH="1">
-            <a:off x="8866339" y="3568250"/>
-            <a:ext cx="720000" cy="765000"/>
-          </a:xfrm>
-          <a:prstGeom prst="straightConnector1">
-            <a:avLst/>
-          </a:prstGeom>
-          <a:ln w="57150">
-            <a:solidFill>
-              <a:schemeClr val="tx2"/>
-            </a:solidFill>
-            <a:tailEnd type="triangle"/>
-          </a:ln>
-        </p:spPr>
-        <p:style>
-          <a:lnRef idx="1">
-            <a:schemeClr val="accent1"/>
-          </a:lnRef>
-          <a:fillRef idx="0">
-            <a:schemeClr val="accent1"/>
-          </a:fillRef>
-          <a:effectRef idx="0">
-            <a:schemeClr val="accent1"/>
-          </a:effectRef>
-          <a:fontRef idx="minor">
-            <a:schemeClr val="tx1"/>
-          </a:fontRef>
-        </p:style>
-      </p:cxnSp>
       <p:sp>
         <p:nvSpPr>
           <p:cNvPr id="3" name="Slide Number">
@@ -16412,6 +16344,80 @@
           </a:p>
         </p:txBody>
       </p:sp>
+      <p:pic>
+        <p:nvPicPr>
+          <p:cNvPr id="11" name="Картина 10">
+            <a:extLst>
+              <a:ext uri="{FF2B5EF4-FFF2-40B4-BE49-F238E27FC236}">
+                <a16:creationId xmlns:a16="http://schemas.microsoft.com/office/drawing/2014/main" id="{A8659AA7-3A12-1E0A-87FA-468D29218471}"/>
+              </a:ext>
+            </a:extLst>
+          </p:cNvPr>
+          <p:cNvPicPr>
+            <a:picLocks noChangeAspect="1"/>
+          </p:cNvPicPr>
+          <p:nvPr/>
+        </p:nvPicPr>
+        <p:blipFill>
+          <a:blip r:embed="rId2"/>
+          <a:stretch>
+            <a:fillRect/>
+          </a:stretch>
+        </p:blipFill>
+        <p:spPr>
+          <a:xfrm>
+            <a:off x="1984482" y="1134006"/>
+            <a:ext cx="8223035" cy="5723994"/>
+          </a:xfrm>
+          <a:prstGeom prst="rect">
+            <a:avLst/>
+          </a:prstGeom>
+        </p:spPr>
+      </p:pic>
+      <p:cxnSp>
+        <p:nvCxnSpPr>
+          <p:cNvPr id="13" name="Straight Arrow Connector 7">
+            <a:extLst>
+              <a:ext uri="{FF2B5EF4-FFF2-40B4-BE49-F238E27FC236}">
+                <a16:creationId xmlns:a16="http://schemas.microsoft.com/office/drawing/2014/main" id="{8A952AA5-D23E-3465-6FBB-AF06339AB37E}"/>
+              </a:ext>
+            </a:extLst>
+          </p:cNvPr>
+          <p:cNvCxnSpPr>
+            <a:cxnSpLocks/>
+          </p:cNvCxnSpPr>
+          <p:nvPr/>
+        </p:nvCxnSpPr>
+        <p:spPr>
+          <a:xfrm flipH="1">
+            <a:off x="9741000" y="4509000"/>
+            <a:ext cx="720000" cy="765000"/>
+          </a:xfrm>
+          <a:prstGeom prst="straightConnector1">
+            <a:avLst/>
+          </a:prstGeom>
+          <a:ln w="57150">
+            <a:solidFill>
+              <a:schemeClr val="tx2"/>
+            </a:solidFill>
+            <a:tailEnd type="triangle"/>
+          </a:ln>
+        </p:spPr>
+        <p:style>
+          <a:lnRef idx="1">
+            <a:schemeClr val="accent1"/>
+          </a:lnRef>
+          <a:fillRef idx="0">
+            <a:schemeClr val="accent1"/>
+          </a:fillRef>
+          <a:effectRef idx="0">
+            <a:schemeClr val="accent1"/>
+          </a:effectRef>
+          <a:fontRef idx="minor">
+            <a:schemeClr val="tx1"/>
+          </a:fontRef>
+        </p:style>
+      </p:cxnSp>
     </p:spTree>
     <p:extLst>
       <p:ext uri="{BB962C8B-B14F-4D97-AF65-F5344CB8AC3E}">
@@ -17139,36 +17145,6 @@
           </a:p>
         </p:txBody>
       </p:sp>
-      <p:pic>
-        <p:nvPicPr>
-          <p:cNvPr id="7" name="Картина 6">
-            <a:extLst>
-              <a:ext uri="{FF2B5EF4-FFF2-40B4-BE49-F238E27FC236}">
-                <a16:creationId xmlns:a16="http://schemas.microsoft.com/office/drawing/2014/main" id="{0237515B-9C91-00C4-A5C9-ECE85CE15BBD}"/>
-              </a:ext>
-            </a:extLst>
-          </p:cNvPr>
-          <p:cNvPicPr>
-            <a:picLocks noChangeAspect="1"/>
-          </p:cNvPicPr>
-          <p:nvPr/>
-        </p:nvPicPr>
-        <p:blipFill>
-          <a:blip r:embed="rId2"/>
-          <a:stretch>
-            <a:fillRect/>
-          </a:stretch>
-        </p:blipFill>
-        <p:spPr>
-          <a:xfrm>
-            <a:off x="5258619" y="3205640"/>
-            <a:ext cx="6494411" cy="3195000"/>
-          </a:xfrm>
-          <a:prstGeom prst="rect">
-            <a:avLst/>
-          </a:prstGeom>
-        </p:spPr>
-      </p:pic>
       <p:sp>
         <p:nvSpPr>
           <p:cNvPr id="5" name="Slide Number">
@@ -17211,6 +17187,36 @@
           </a:p>
         </p:txBody>
       </p:sp>
+      <p:pic>
+        <p:nvPicPr>
+          <p:cNvPr id="9" name="Картина 8">
+            <a:extLst>
+              <a:ext uri="{FF2B5EF4-FFF2-40B4-BE49-F238E27FC236}">
+                <a16:creationId xmlns:a16="http://schemas.microsoft.com/office/drawing/2014/main" id="{E8B8D783-1A64-EAB7-2A11-4C92344075D3}"/>
+              </a:ext>
+            </a:extLst>
+          </p:cNvPr>
+          <p:cNvPicPr>
+            <a:picLocks noChangeAspect="1"/>
+          </p:cNvPicPr>
+          <p:nvPr/>
+        </p:nvPicPr>
+        <p:blipFill>
+          <a:blip r:embed="rId2"/>
+          <a:stretch>
+            <a:fillRect/>
+          </a:stretch>
+        </p:blipFill>
+        <p:spPr>
+          <a:xfrm>
+            <a:off x="5376000" y="2482373"/>
+            <a:ext cx="6387964" cy="3902182"/>
+          </a:xfrm>
+          <a:prstGeom prst="rect">
+            <a:avLst/>
+          </a:prstGeom>
+        </p:spPr>
+      </p:pic>
     </p:spTree>
     <p:extLst>
       <p:ext uri="{BB962C8B-B14F-4D97-AF65-F5344CB8AC3E}">
@@ -20048,43 +20054,6 @@
           </a:p>
         </p:txBody>
       </p:sp>
-      <p:pic>
-        <p:nvPicPr>
-          <p:cNvPr id="9" name="Картина 8">
-            <a:extLst>
-              <a:ext uri="{FF2B5EF4-FFF2-40B4-BE49-F238E27FC236}">
-                <a16:creationId xmlns:a16="http://schemas.microsoft.com/office/drawing/2014/main" id="{AAD18053-6377-661C-5583-0E937A9D9BC0}"/>
-              </a:ext>
-            </a:extLst>
-          </p:cNvPr>
-          <p:cNvPicPr>
-            <a:picLocks noChangeAspect="1"/>
-          </p:cNvPicPr>
-          <p:nvPr/>
-        </p:nvPicPr>
-        <p:blipFill>
-          <a:blip r:embed="rId2"/>
-          <a:stretch>
-            <a:fillRect/>
-          </a:stretch>
-        </p:blipFill>
-        <p:spPr>
-          <a:xfrm>
-            <a:off x="5884122" y="1449000"/>
-            <a:ext cx="6039952" cy="4455000"/>
-          </a:xfrm>
-          <a:prstGeom prst="rect">
-            <a:avLst/>
-          </a:prstGeom>
-          <a:ln>
-            <a:solidFill>
-              <a:schemeClr val="bg2">
-                <a:lumMod val="75000"/>
-              </a:schemeClr>
-            </a:solidFill>
-          </a:ln>
-        </p:spPr>
-      </p:pic>
       <p:sp>
         <p:nvSpPr>
           <p:cNvPr id="3" name="Slide Number">
@@ -20127,6 +20096,49 @@
           </a:p>
         </p:txBody>
       </p:sp>
+      <p:pic>
+        <p:nvPicPr>
+          <p:cNvPr id="8" name="Картина 7">
+            <a:extLst>
+              <a:ext uri="{FF2B5EF4-FFF2-40B4-BE49-F238E27FC236}">
+                <a16:creationId xmlns:a16="http://schemas.microsoft.com/office/drawing/2014/main" id="{D54E4DBC-CD60-70C6-BC96-FEBEF7E02796}"/>
+              </a:ext>
+            </a:extLst>
+          </p:cNvPr>
+          <p:cNvPicPr>
+            <a:picLocks noChangeAspect="1"/>
+          </p:cNvPicPr>
+          <p:nvPr/>
+        </p:nvPicPr>
+        <p:blipFill>
+          <a:blip r:embed="rId2">
+            <a:extLst>
+              <a:ext uri="{28A0092B-C50C-407E-A947-70E740481C1C}">
+                <a14:useLocalDpi xmlns:a14="http://schemas.microsoft.com/office/drawing/2010/main" val="0"/>
+              </a:ext>
+            </a:extLst>
+          </a:blip>
+          <a:stretch>
+            <a:fillRect/>
+          </a:stretch>
+        </p:blipFill>
+        <p:spPr>
+          <a:xfrm>
+            <a:off x="5697087" y="1404240"/>
+            <a:ext cx="6304511" cy="4139760"/>
+          </a:xfrm>
+          <a:prstGeom prst="rect">
+            <a:avLst/>
+          </a:prstGeom>
+          <a:ln>
+            <a:solidFill>
+              <a:schemeClr val="bg2">
+                <a:lumMod val="75000"/>
+              </a:schemeClr>
+            </a:solidFill>
+          </a:ln>
+        </p:spPr>
+      </p:pic>
     </p:spTree>
     <p:extLst>
       <p:ext uri="{BB962C8B-B14F-4D97-AF65-F5344CB8AC3E}">
@@ -20277,7 +20289,7 @@
                                           </p:stCondLst>
                                         </p:cTn>
                                         <p:tgtEl>
-                                          <p:spTgt spid="9"/>
+                                          <p:spTgt spid="8"/>
                                         </p:tgtEl>
                                         <p:attrNameLst>
                                           <p:attrName>style.visibility</p:attrName>

</xml_diff>